<commit_message>
updated schema and flowchart to reflect new table
</commit_message>
<xml_diff>
--- a/resources/flowchart.pptx
+++ b/resources/flowchart.pptx
@@ -259,7 +259,7 @@
           <a:p>
             <a:fld id="{E700A6F8-1C47-4BB8-A7F5-CF2765752BCF}" type="datetimeFigureOut">
               <a:rPr lang="en-US" smtClean="0"/>
-              <a:t>3/26/2022</a:t>
+              <a:t>4/3/2022</a:t>
             </a:fld>
             <a:endParaRPr lang="en-US"/>
           </a:p>
@@ -457,7 +457,7 @@
           <a:p>
             <a:fld id="{E700A6F8-1C47-4BB8-A7F5-CF2765752BCF}" type="datetimeFigureOut">
               <a:rPr lang="en-US" smtClean="0"/>
-              <a:t>3/26/2022</a:t>
+              <a:t>4/3/2022</a:t>
             </a:fld>
             <a:endParaRPr lang="en-US"/>
           </a:p>
@@ -665,7 +665,7 @@
           <a:p>
             <a:fld id="{E700A6F8-1C47-4BB8-A7F5-CF2765752BCF}" type="datetimeFigureOut">
               <a:rPr lang="en-US" smtClean="0"/>
-              <a:t>3/26/2022</a:t>
+              <a:t>4/3/2022</a:t>
             </a:fld>
             <a:endParaRPr lang="en-US"/>
           </a:p>
@@ -863,7 +863,7 @@
           <a:p>
             <a:fld id="{E700A6F8-1C47-4BB8-A7F5-CF2765752BCF}" type="datetimeFigureOut">
               <a:rPr lang="en-US" smtClean="0"/>
-              <a:t>3/26/2022</a:t>
+              <a:t>4/3/2022</a:t>
             </a:fld>
             <a:endParaRPr lang="en-US"/>
           </a:p>
@@ -1138,7 +1138,7 @@
           <a:p>
             <a:fld id="{E700A6F8-1C47-4BB8-A7F5-CF2765752BCF}" type="datetimeFigureOut">
               <a:rPr lang="en-US" smtClean="0"/>
-              <a:t>3/26/2022</a:t>
+              <a:t>4/3/2022</a:t>
             </a:fld>
             <a:endParaRPr lang="en-US"/>
           </a:p>
@@ -1403,7 +1403,7 @@
           <a:p>
             <a:fld id="{E700A6F8-1C47-4BB8-A7F5-CF2765752BCF}" type="datetimeFigureOut">
               <a:rPr lang="en-US" smtClean="0"/>
-              <a:t>3/26/2022</a:t>
+              <a:t>4/3/2022</a:t>
             </a:fld>
             <a:endParaRPr lang="en-US"/>
           </a:p>
@@ -1815,7 +1815,7 @@
           <a:p>
             <a:fld id="{E700A6F8-1C47-4BB8-A7F5-CF2765752BCF}" type="datetimeFigureOut">
               <a:rPr lang="en-US" smtClean="0"/>
-              <a:t>3/26/2022</a:t>
+              <a:t>4/3/2022</a:t>
             </a:fld>
             <a:endParaRPr lang="en-US"/>
           </a:p>
@@ -1956,7 +1956,7 @@
           <a:p>
             <a:fld id="{E700A6F8-1C47-4BB8-A7F5-CF2765752BCF}" type="datetimeFigureOut">
               <a:rPr lang="en-US" smtClean="0"/>
-              <a:t>3/26/2022</a:t>
+              <a:t>4/3/2022</a:t>
             </a:fld>
             <a:endParaRPr lang="en-US"/>
           </a:p>
@@ -2069,7 +2069,7 @@
           <a:p>
             <a:fld id="{E700A6F8-1C47-4BB8-A7F5-CF2765752BCF}" type="datetimeFigureOut">
               <a:rPr lang="en-US" smtClean="0"/>
-              <a:t>3/26/2022</a:t>
+              <a:t>4/3/2022</a:t>
             </a:fld>
             <a:endParaRPr lang="en-US"/>
           </a:p>
@@ -2380,7 +2380,7 @@
           <a:p>
             <a:fld id="{E700A6F8-1C47-4BB8-A7F5-CF2765752BCF}" type="datetimeFigureOut">
               <a:rPr lang="en-US" smtClean="0"/>
-              <a:t>3/26/2022</a:t>
+              <a:t>4/3/2022</a:t>
             </a:fld>
             <a:endParaRPr lang="en-US"/>
           </a:p>
@@ -2668,7 +2668,7 @@
           <a:p>
             <a:fld id="{E700A6F8-1C47-4BB8-A7F5-CF2765752BCF}" type="datetimeFigureOut">
               <a:rPr lang="en-US" smtClean="0"/>
-              <a:t>3/26/2022</a:t>
+              <a:t>4/3/2022</a:t>
             </a:fld>
             <a:endParaRPr lang="en-US"/>
           </a:p>
@@ -2909,7 +2909,7 @@
           <a:p>
             <a:fld id="{E700A6F8-1C47-4BB8-A7F5-CF2765752BCF}" type="datetimeFigureOut">
               <a:rPr lang="en-US" smtClean="0"/>
-              <a:t>3/26/2022</a:t>
+              <a:t>4/3/2022</a:t>
             </a:fld>
             <a:endParaRPr lang="en-US"/>
           </a:p>
@@ -3742,7 +3742,7 @@
             <a:pPr algn="ctr"/>
             <a:r>
               <a:rPr lang="en-US" sz="1100" dirty="0" err="1"/>
-              <a:t>stats.ipynb</a:t>
+              <a:t>Statistical_Analysis.ipynb</a:t>
             </a:r>
             <a:endParaRPr lang="en-US" sz="1100" dirty="0"/>
           </a:p>
@@ -3959,72 +3959,6 @@
       </p:cxnSp>
       <p:sp>
         <p:nvSpPr>
-          <p:cNvPr id="41" name="Flowchart: Document 40">
-            <a:extLst>
-              <a:ext uri="{FF2B5EF4-FFF2-40B4-BE49-F238E27FC236}">
-                <a16:creationId xmlns:a16="http://schemas.microsoft.com/office/drawing/2014/main" id="{81983E33-C3C9-4A8C-933D-DF056E34FAFB}"/>
-              </a:ext>
-            </a:extLst>
-          </p:cNvPr>
-          <p:cNvSpPr/>
-          <p:nvPr/>
-        </p:nvSpPr>
-        <p:spPr>
-          <a:xfrm>
-            <a:off x="312255" y="2223335"/>
-            <a:ext cx="1543907" cy="966642"/>
-          </a:xfrm>
-          <a:prstGeom prst="flowChartDocument">
-            <a:avLst/>
-          </a:prstGeom>
-        </p:spPr>
-        <p:style>
-          <a:lnRef idx="2">
-            <a:schemeClr val="accent1"/>
-          </a:lnRef>
-          <a:fillRef idx="1">
-            <a:schemeClr val="lt1"/>
-          </a:fillRef>
-          <a:effectRef idx="0">
-            <a:schemeClr val="accent1"/>
-          </a:effectRef>
-          <a:fontRef idx="minor">
-            <a:schemeClr val="dk1"/>
-          </a:fontRef>
-        </p:style>
-        <p:txBody>
-          <a:bodyPr rtlCol="0" anchor="ctr"/>
-          <a:lstStyle/>
-          <a:p>
-            <a:pPr algn="ctr"/>
-            <a:r>
-              <a:rPr lang="en-US" sz="1400" dirty="0"/>
-              <a:t>Other data</a:t>
-            </a:r>
-          </a:p>
-          <a:p>
-            <a:pPr algn="ctr"/>
-            <a:r>
-              <a:rPr lang="en-US" sz="900" dirty="0"/>
-              <a:t>Russia_losses_personnel.csv</a:t>
-            </a:r>
-          </a:p>
-          <a:p>
-            <a:pPr algn="ctr"/>
-            <a:r>
-              <a:rPr lang="en-US" sz="900" dirty="0"/>
-              <a:t>+ UN Refugee Agency </a:t>
-            </a:r>
-            <a:r>
-              <a:rPr lang="en-US" sz="900"/>
-              <a:t>migration data</a:t>
-            </a:r>
-            <a:endParaRPr lang="en-US" sz="900" dirty="0"/>
-          </a:p>
-        </p:txBody>
-      </p:sp>
-      <p:sp>
-        <p:nvSpPr>
           <p:cNvPr id="42" name="Flowchart: Process 41">
             <a:extLst>
               <a:ext uri="{FF2B5EF4-FFF2-40B4-BE49-F238E27FC236}">
@@ -4783,54 +4717,6 @@
           </a:p>
         </p:txBody>
       </p:sp>
-      <p:sp>
-        <p:nvSpPr>
-          <p:cNvPr id="56" name="Flowchart: Document 55">
-            <a:extLst>
-              <a:ext uri="{FF2B5EF4-FFF2-40B4-BE49-F238E27FC236}">
-                <a16:creationId xmlns:a16="http://schemas.microsoft.com/office/drawing/2014/main" id="{EFAC2A6C-5D31-43CA-A1C0-EE55D560E4E4}"/>
-              </a:ext>
-            </a:extLst>
-          </p:cNvPr>
-          <p:cNvSpPr/>
-          <p:nvPr/>
-        </p:nvSpPr>
-        <p:spPr>
-          <a:xfrm>
-            <a:off x="3591819" y="4585853"/>
-            <a:ext cx="1079700" cy="622225"/>
-          </a:xfrm>
-          <a:prstGeom prst="flowChartDocument">
-            <a:avLst/>
-          </a:prstGeom>
-        </p:spPr>
-        <p:style>
-          <a:lnRef idx="2">
-            <a:schemeClr val="accent1"/>
-          </a:lnRef>
-          <a:fillRef idx="1">
-            <a:schemeClr val="lt1"/>
-          </a:fillRef>
-          <a:effectRef idx="0">
-            <a:schemeClr val="accent1"/>
-          </a:effectRef>
-          <a:fontRef idx="minor">
-            <a:schemeClr val="dk1"/>
-          </a:fontRef>
-        </p:style>
-        <p:txBody>
-          <a:bodyPr rtlCol="0" anchor="ctr"/>
-          <a:lstStyle/>
-          <a:p>
-            <a:pPr algn="ctr"/>
-            <a:r>
-              <a:rPr lang="en-US" sz="1000" dirty="0" err="1"/>
-              <a:t>ukraine_analysis.sqlite</a:t>
-            </a:r>
-            <a:endParaRPr lang="en-US" sz="1000" dirty="0"/>
-          </a:p>
-        </p:txBody>
-      </p:sp>
       <p:cxnSp>
         <p:nvCxnSpPr>
           <p:cNvPr id="36" name="Straight Arrow Connector 35">
@@ -4931,6 +4817,123 @@
           <a:p>
             <a:pPr algn="ctr"/>
             <a:endParaRPr lang="en-US" dirty="0"/>
+          </a:p>
+        </p:txBody>
+      </p:sp>
+      <p:sp>
+        <p:nvSpPr>
+          <p:cNvPr id="4" name="Flowchart: Multidocument 3">
+            <a:extLst>
+              <a:ext uri="{FF2B5EF4-FFF2-40B4-BE49-F238E27FC236}">
+                <a16:creationId xmlns:a16="http://schemas.microsoft.com/office/drawing/2014/main" id="{44807237-44AC-4198-B419-7C1469685001}"/>
+              </a:ext>
+            </a:extLst>
+          </p:cNvPr>
+          <p:cNvSpPr/>
+          <p:nvPr/>
+        </p:nvSpPr>
+        <p:spPr>
+          <a:xfrm>
+            <a:off x="113411" y="1962242"/>
+            <a:ext cx="1809308" cy="1264761"/>
+          </a:xfrm>
+          <a:prstGeom prst="flowChartMultidocument">
+            <a:avLst/>
+          </a:prstGeom>
+        </p:spPr>
+        <p:style>
+          <a:lnRef idx="2">
+            <a:schemeClr val="accent1"/>
+          </a:lnRef>
+          <a:fillRef idx="1">
+            <a:schemeClr val="lt1"/>
+          </a:fillRef>
+          <a:effectRef idx="0">
+            <a:schemeClr val="accent1"/>
+          </a:effectRef>
+          <a:fontRef idx="minor">
+            <a:schemeClr val="dk1"/>
+          </a:fontRef>
+        </p:style>
+        <p:txBody>
+          <a:bodyPr rtlCol="0" anchor="ctr"/>
+          <a:lstStyle/>
+          <a:p>
+            <a:pPr algn="ctr"/>
+            <a:r>
+              <a:rPr lang="en-US" sz="1400" dirty="0"/>
+              <a:t>Other data</a:t>
+            </a:r>
+          </a:p>
+          <a:p>
+            <a:pPr algn="ctr"/>
+            <a:r>
+              <a:rPr lang="en-US" sz="1000" dirty="0"/>
+              <a:t>Russian Personnel Losses + </a:t>
+            </a:r>
+            <a:r>
+              <a:rPr lang="en-US" sz="1000" dirty="0" err="1"/>
+              <a:t>Ukranian</a:t>
+            </a:r>
+            <a:r>
+              <a:rPr lang="en-US" sz="1000" dirty="0"/>
+              <a:t> Casualties</a:t>
+            </a:r>
+          </a:p>
+          <a:p>
+            <a:pPr algn="ctr"/>
+            <a:r>
+              <a:rPr lang="en-US" sz="1000" dirty="0"/>
+              <a:t>+ UN Refugee Agency migration data</a:t>
+            </a:r>
+          </a:p>
+        </p:txBody>
+      </p:sp>
+      <p:sp>
+        <p:nvSpPr>
+          <p:cNvPr id="5" name="Flowchart: Magnetic Disk 4">
+            <a:extLst>
+              <a:ext uri="{FF2B5EF4-FFF2-40B4-BE49-F238E27FC236}">
+                <a16:creationId xmlns:a16="http://schemas.microsoft.com/office/drawing/2014/main" id="{071F865F-0F71-4A1C-9C32-AF3C870C4245}"/>
+              </a:ext>
+            </a:extLst>
+          </p:cNvPr>
+          <p:cNvSpPr/>
+          <p:nvPr/>
+        </p:nvSpPr>
+        <p:spPr>
+          <a:xfrm>
+            <a:off x="3680514" y="4471408"/>
+            <a:ext cx="1139445" cy="622223"/>
+          </a:xfrm>
+          <a:prstGeom prst="flowChartMagneticDisk">
+            <a:avLst/>
+          </a:prstGeom>
+        </p:spPr>
+        <p:style>
+          <a:lnRef idx="2">
+            <a:schemeClr val="accent1"/>
+          </a:lnRef>
+          <a:fillRef idx="1">
+            <a:schemeClr val="lt1"/>
+          </a:fillRef>
+          <a:effectRef idx="0">
+            <a:schemeClr val="accent1"/>
+          </a:effectRef>
+          <a:fontRef idx="minor">
+            <a:schemeClr val="dk1"/>
+          </a:fontRef>
+        </p:style>
+        <p:txBody>
+          <a:bodyPr rtlCol="0" anchor="ctr"/>
+          <a:lstStyle/>
+          <a:p>
+            <a:pPr algn="ctr"/>
+            <a:r>
+              <a:rPr lang="en-US" sz="1000" dirty="0" err="1"/>
+              <a:t>ukraine_analysis.sqlite</a:t>
+            </a:r>
+            <a:endParaRPr lang="en-US" sz="1000" dirty="0"/>
           </a:p>
         </p:txBody>
       </p:sp>

</xml_diff>